<commit_message>
new fields for variation
</commit_message>
<xml_diff>
--- a/main_testing.pptx
+++ b/main_testing.pptx
@@ -7,6 +7,7 @@
   <p:sldIdLst>
     <p:sldId id="256" r:id="rId2"/>
     <p:sldId id="257" r:id="rId3"/>
+    <p:sldId id="258" r:id="rId4"/>
   </p:sldIdLst>
   <p:sldSz cx="12192000" cy="6858000"/>
   <p:notesSz cx="6858000" cy="9144000"/>
@@ -448,7 +449,7 @@
           <a:p>
             <a:fld id="{0FFCB9F6-63FC-4ED5-A42C-D418A1CF0414}" type="datetimeFigureOut">
               <a:rPr lang="pt-BR" smtClean="0"/>
-              <a:t>11/01/2026</a:t>
+              <a:t>13/01/2026</a:t>
             </a:fld>
             <a:endParaRPr lang="pt-BR"/>
           </a:p>
@@ -1536,7 +1537,7 @@
           <a:p>
             <a:fld id="{0FFCB9F6-63FC-4ED5-A42C-D418A1CF0414}" type="datetimeFigureOut">
               <a:rPr lang="pt-BR" smtClean="0"/>
-              <a:t>11/01/2026</a:t>
+              <a:t>13/01/2026</a:t>
             </a:fld>
             <a:endParaRPr lang="pt-BR"/>
           </a:p>
@@ -2516,7 +2517,7 @@
           <a:p>
             <a:fld id="{0FFCB9F6-63FC-4ED5-A42C-D418A1CF0414}" type="datetimeFigureOut">
               <a:rPr lang="pt-BR" smtClean="0"/>
-              <a:t>11/01/2026</a:t>
+              <a:t>13/01/2026</a:t>
             </a:fld>
             <a:endParaRPr lang="pt-BR"/>
           </a:p>
@@ -3650,7 +3651,7 @@
           <a:p>
             <a:fld id="{0FFCB9F6-63FC-4ED5-A42C-D418A1CF0414}" type="datetimeFigureOut">
               <a:rPr lang="pt-BR" smtClean="0"/>
-              <a:t>11/01/2026</a:t>
+              <a:t>13/01/2026</a:t>
             </a:fld>
             <a:endParaRPr lang="pt-BR"/>
           </a:p>
@@ -4683,7 +4684,7 @@
           <a:p>
             <a:fld id="{0FFCB9F6-63FC-4ED5-A42C-D418A1CF0414}" type="datetimeFigureOut">
               <a:rPr lang="pt-BR" smtClean="0"/>
-              <a:t>11/01/2026</a:t>
+              <a:t>13/01/2026</a:t>
             </a:fld>
             <a:endParaRPr lang="pt-BR"/>
           </a:p>
@@ -5343,7 +5344,7 @@
           <a:p>
             <a:fld id="{0FFCB9F6-63FC-4ED5-A42C-D418A1CF0414}" type="datetimeFigureOut">
               <a:rPr lang="pt-BR" smtClean="0"/>
-              <a:t>11/01/2026</a:t>
+              <a:t>13/01/2026</a:t>
             </a:fld>
             <a:endParaRPr lang="pt-BR"/>
           </a:p>
@@ -6204,7 +6205,7 @@
           <a:p>
             <a:fld id="{0FFCB9F6-63FC-4ED5-A42C-D418A1CF0414}" type="datetimeFigureOut">
               <a:rPr lang="pt-BR" smtClean="0"/>
-              <a:t>11/01/2026</a:t>
+              <a:t>13/01/2026</a:t>
             </a:fld>
             <a:endParaRPr lang="pt-BR"/>
           </a:p>
@@ -6394,7 +6395,7 @@
           <a:p>
             <a:fld id="{0FFCB9F6-63FC-4ED5-A42C-D418A1CF0414}" type="datetimeFigureOut">
               <a:rPr lang="pt-BR" smtClean="0"/>
-              <a:t>11/01/2026</a:t>
+              <a:t>13/01/2026</a:t>
             </a:fld>
             <a:endParaRPr lang="pt-BR"/>
           </a:p>
@@ -7366,7 +7367,7 @@
           <a:p>
             <a:fld id="{0FFCB9F6-63FC-4ED5-A42C-D418A1CF0414}" type="datetimeFigureOut">
               <a:rPr lang="pt-BR" smtClean="0"/>
-              <a:t>11/01/2026</a:t>
+              <a:t>13/01/2026</a:t>
             </a:fld>
             <a:endParaRPr lang="pt-BR"/>
           </a:p>
@@ -7577,7 +7578,7 @@
           <a:p>
             <a:fld id="{0FFCB9F6-63FC-4ED5-A42C-D418A1CF0414}" type="datetimeFigureOut">
               <a:rPr lang="pt-BR" smtClean="0"/>
-              <a:t>11/01/2026</a:t>
+              <a:t>13/01/2026</a:t>
             </a:fld>
             <a:endParaRPr lang="pt-BR"/>
           </a:p>
@@ -8611,7 +8612,7 @@
           <a:p>
             <a:fld id="{0FFCB9F6-63FC-4ED5-A42C-D418A1CF0414}" type="datetimeFigureOut">
               <a:rPr lang="pt-BR" smtClean="0"/>
-              <a:t>11/01/2026</a:t>
+              <a:t>13/01/2026</a:t>
             </a:fld>
             <a:endParaRPr lang="pt-BR"/>
           </a:p>
@@ -8883,7 +8884,7 @@
           <a:p>
             <a:fld id="{0FFCB9F6-63FC-4ED5-A42C-D418A1CF0414}" type="datetimeFigureOut">
               <a:rPr lang="pt-BR" smtClean="0"/>
-              <a:t>11/01/2026</a:t>
+              <a:t>13/01/2026</a:t>
             </a:fld>
             <a:endParaRPr lang="pt-BR"/>
           </a:p>
@@ -9293,7 +9294,7 @@
           <a:p>
             <a:fld id="{0FFCB9F6-63FC-4ED5-A42C-D418A1CF0414}" type="datetimeFigureOut">
               <a:rPr lang="pt-BR" smtClean="0"/>
-              <a:t>11/01/2026</a:t>
+              <a:t>13/01/2026</a:t>
             </a:fld>
             <a:endParaRPr lang="pt-BR"/>
           </a:p>
@@ -9420,7 +9421,7 @@
           <a:p>
             <a:fld id="{0FFCB9F6-63FC-4ED5-A42C-D418A1CF0414}" type="datetimeFigureOut">
               <a:rPr lang="pt-BR" smtClean="0"/>
-              <a:t>11/01/2026</a:t>
+              <a:t>13/01/2026</a:t>
             </a:fld>
             <a:endParaRPr lang="pt-BR"/>
           </a:p>
@@ -9515,7 +9516,7 @@
           <a:p>
             <a:fld id="{0FFCB9F6-63FC-4ED5-A42C-D418A1CF0414}" type="datetimeFigureOut">
               <a:rPr lang="pt-BR" smtClean="0"/>
-              <a:t>11/01/2026</a:t>
+              <a:t>13/01/2026</a:t>
             </a:fld>
             <a:endParaRPr lang="pt-BR"/>
           </a:p>
@@ -10596,7 +10597,7 @@
           <a:p>
             <a:fld id="{0FFCB9F6-63FC-4ED5-A42C-D418A1CF0414}" type="datetimeFigureOut">
               <a:rPr lang="pt-BR" smtClean="0"/>
-              <a:t>11/01/2026</a:t>
+              <a:t>13/01/2026</a:t>
             </a:fld>
             <a:endParaRPr lang="pt-BR"/>
           </a:p>
@@ -11704,7 +11705,7 @@
           <a:p>
             <a:fld id="{0FFCB9F6-63FC-4ED5-A42C-D418A1CF0414}" type="datetimeFigureOut">
               <a:rPr lang="pt-BR" smtClean="0"/>
-              <a:t>11/01/2026</a:t>
+              <a:t>13/01/2026</a:t>
             </a:fld>
             <a:endParaRPr lang="pt-BR"/>
           </a:p>
@@ -12701,7 +12702,7 @@
           <a:p>
             <a:fld id="{0FFCB9F6-63FC-4ED5-A42C-D418A1CF0414}" type="datetimeFigureOut">
               <a:rPr lang="pt-BR" smtClean="0"/>
-              <a:t>11/01/2026</a:t>
+              <a:t>13/01/2026</a:t>
             </a:fld>
             <a:endParaRPr lang="pt-BR"/>
           </a:p>
@@ -14515,6 +14516,308 @@
 </p:sld>
 </file>
 
+<file path=ppt/slides/slide3.xml><?xml version="1.0" encoding="utf-8"?>
+<p:sld xmlns:a="http://schemas.openxmlformats.org/drawingml/2006/main" xmlns:r="http://schemas.openxmlformats.org/officeDocument/2006/relationships" xmlns:p="http://schemas.openxmlformats.org/presentationml/2006/main">
+  <p:cSld>
+    <p:spTree>
+      <p:nvGrpSpPr>
+        <p:cNvPr id="1" name=""/>
+        <p:cNvGrpSpPr/>
+        <p:nvPr/>
+      </p:nvGrpSpPr>
+      <p:grpSpPr>
+        <a:xfrm>
+          <a:off x="0" y="0"/>
+          <a:ext cx="0" cy="0"/>
+          <a:chOff x="0" y="0"/>
+          <a:chExt cx="0" cy="0"/>
+        </a:xfrm>
+      </p:grpSpPr>
+      <p:sp>
+        <p:nvSpPr>
+          <p:cNvPr id="2" name="Título 1">
+            <a:extLst>
+              <a:ext uri="{FF2B5EF4-FFF2-40B4-BE49-F238E27FC236}">
+                <a16:creationId xmlns:a16="http://schemas.microsoft.com/office/drawing/2014/main" id="{375CEC55-5620-0728-8DD1-2BEC363F608F}"/>
+              </a:ext>
+            </a:extLst>
+          </p:cNvPr>
+          <p:cNvSpPr>
+            <a:spLocks noGrp="1"/>
+          </p:cNvSpPr>
+          <p:nvPr>
+            <p:ph type="title"/>
+          </p:nvPr>
+        </p:nvSpPr>
+        <p:spPr>
+          <a:xfrm>
+            <a:off x="1046922" y="509842"/>
+            <a:ext cx="8761413" cy="706964"/>
+          </a:xfrm>
+        </p:spPr>
+        <p:txBody>
+          <a:bodyPr/>
+          <a:lstStyle/>
+          <a:p>
+            <a:r>
+              <a:rPr lang="pt-BR" sz="3600" dirty="0"/>
+              <a:t>Outro título de exemplo</a:t>
+            </a:r>
+            <a:endParaRPr lang="pt-BR" dirty="0"/>
+          </a:p>
+        </p:txBody>
+      </p:sp>
+      <p:sp>
+        <p:nvSpPr>
+          <p:cNvPr id="3" name="Marcador de Posição de Conteúdo 2">
+            <a:extLst>
+              <a:ext uri="{FF2B5EF4-FFF2-40B4-BE49-F238E27FC236}">
+                <a16:creationId xmlns:a16="http://schemas.microsoft.com/office/drawing/2014/main" id="{C57F8E77-A7A9-E30B-4CEE-50AF85F63643}"/>
+              </a:ext>
+            </a:extLst>
+          </p:cNvPr>
+          <p:cNvSpPr>
+            <a:spLocks noGrp="1"/>
+          </p:cNvSpPr>
+          <p:nvPr>
+            <p:ph idx="1"/>
+          </p:nvPr>
+        </p:nvSpPr>
+        <p:spPr>
+          <a:xfrm>
+            <a:off x="1046922" y="1216806"/>
+            <a:ext cx="8825659" cy="537265"/>
+          </a:xfrm>
+        </p:spPr>
+        <p:txBody>
+          <a:bodyPr/>
+          <a:lstStyle/>
+          <a:p>
+            <a:r>
+              <a:rPr lang="pt-BR" sz="1800" dirty="0">
+                <a:solidFill>
+                  <a:schemeClr val="bg1"/>
+                </a:solidFill>
+              </a:rPr>
+              <a:t>Outro subtítulo de exemplo</a:t>
+            </a:r>
+          </a:p>
+        </p:txBody>
+      </p:sp>
+      <p:pic>
+        <p:nvPicPr>
+          <p:cNvPr id="5" name="Imagem 4" descr="09_seguros_cartoes_total.png">
+            <a:extLst>
+              <a:ext uri="{FF2B5EF4-FFF2-40B4-BE49-F238E27FC236}">
+                <a16:creationId xmlns:a16="http://schemas.microsoft.com/office/drawing/2014/main" id="{D840404B-A47E-6A9F-A40B-036A8F14A081}"/>
+              </a:ext>
+            </a:extLst>
+          </p:cNvPr>
+          <p:cNvPicPr>
+            <a:picLocks noChangeAspect="1"/>
+          </p:cNvPicPr>
+          <p:nvPr/>
+        </p:nvPicPr>
+        <p:blipFill>
+          <a:blip r:embed="rId2">
+            <a:extLst>
+              <a:ext uri="{28A0092B-C50C-407E-A947-70E740481C1C}">
+                <a14:useLocalDpi xmlns:a14="http://schemas.microsoft.com/office/drawing/2010/main" val="0"/>
+              </a:ext>
+            </a:extLst>
+          </a:blip>
+          <a:stretch>
+            <a:fillRect/>
+          </a:stretch>
+        </p:blipFill>
+        <p:spPr>
+          <a:xfrm>
+            <a:off x="7070988" y="2582450"/>
+            <a:ext cx="5121012" cy="2464299"/>
+          </a:xfrm>
+          <a:prstGeom prst="rect">
+            <a:avLst/>
+          </a:prstGeom>
+        </p:spPr>
+      </p:pic>
+      <p:pic>
+        <p:nvPicPr>
+          <p:cNvPr id="7" name="Imagem 6" descr="08_emprestimos_empilhado.png">
+            <a:extLst>
+              <a:ext uri="{FF2B5EF4-FFF2-40B4-BE49-F238E27FC236}">
+                <a16:creationId xmlns:a16="http://schemas.microsoft.com/office/drawing/2014/main" id="{9C13C664-05E8-1769-F9F7-133DBFCE9BD2}"/>
+              </a:ext>
+            </a:extLst>
+          </p:cNvPr>
+          <p:cNvPicPr>
+            <a:picLocks noChangeAspect="1"/>
+          </p:cNvPicPr>
+          <p:nvPr/>
+        </p:nvPicPr>
+        <p:blipFill>
+          <a:blip r:embed="rId3">
+            <a:extLst>
+              <a:ext uri="{28A0092B-C50C-407E-A947-70E740481C1C}">
+                <a14:useLocalDpi xmlns:a14="http://schemas.microsoft.com/office/drawing/2010/main" val="0"/>
+              </a:ext>
+            </a:extLst>
+          </a:blip>
+          <a:stretch>
+            <a:fillRect/>
+          </a:stretch>
+        </p:blipFill>
+        <p:spPr>
+          <a:xfrm>
+            <a:off x="131772" y="2501207"/>
+            <a:ext cx="5327979" cy="2626786"/>
+          </a:xfrm>
+          <a:prstGeom prst="rect">
+            <a:avLst/>
+          </a:prstGeom>
+        </p:spPr>
+      </p:pic>
+      <p:sp>
+        <p:nvSpPr>
+          <p:cNvPr id="9" name="CaixaDeTexto 8">
+            <a:extLst>
+              <a:ext uri="{FF2B5EF4-FFF2-40B4-BE49-F238E27FC236}">
+                <a16:creationId xmlns:a16="http://schemas.microsoft.com/office/drawing/2014/main" id="{04D477C1-19D4-07E3-9F33-09F5008F12C0}"/>
+              </a:ext>
+            </a:extLst>
+          </p:cNvPr>
+          <p:cNvSpPr txBox="1"/>
+          <p:nvPr/>
+        </p:nvSpPr>
+        <p:spPr>
+          <a:xfrm>
+            <a:off x="5121013" y="3038472"/>
+            <a:ext cx="1946367" cy="369332"/>
+          </a:xfrm>
+          <a:prstGeom prst="rect">
+            <a:avLst/>
+          </a:prstGeom>
+          <a:noFill/>
+        </p:spPr>
+        <p:txBody>
+          <a:bodyPr wrap="none" rtlCol="0">
+            <a:spAutoFit/>
+          </a:bodyPr>
+          <a:lstStyle/>
+          <a:p>
+            <a:r>
+              <a:rPr>
+                <a:solidFill>
+                  <a:srgbClr val="C00000"/>
+                </a:solidFill>
+              </a:rPr>
+              <a:t>▼</a:t>
+            </a:r>
+            <a:r>
+              <a:rPr/>
+              <a:t> 15,4%</a:t>
+            </a:r>
+          </a:p>
+        </p:txBody>
+      </p:sp>
+      <p:sp>
+        <p:nvSpPr>
+          <p:cNvPr id="10" name="CaixaDeTexto 9">
+            <a:extLst>
+              <a:ext uri="{FF2B5EF4-FFF2-40B4-BE49-F238E27FC236}">
+                <a16:creationId xmlns:a16="http://schemas.microsoft.com/office/drawing/2014/main" id="{F6040E78-8F40-0441-2068-D06A4DCD50CB}"/>
+              </a:ext>
+            </a:extLst>
+          </p:cNvPr>
+          <p:cNvSpPr txBox="1"/>
+          <p:nvPr/>
+        </p:nvSpPr>
+        <p:spPr>
+          <a:xfrm>
+            <a:off x="5117403" y="3393975"/>
+            <a:ext cx="1587294" cy="369332"/>
+          </a:xfrm>
+          <a:prstGeom prst="rect">
+            <a:avLst/>
+          </a:prstGeom>
+          <a:noFill/>
+        </p:spPr>
+        <p:txBody>
+          <a:bodyPr wrap="none" rtlCol="0">
+            <a:spAutoFit/>
+          </a:bodyPr>
+          <a:lstStyle/>
+          <a:p>
+            <a:r>
+              <a:rPr>
+                <a:solidFill>
+                  <a:srgbClr val="00B050"/>
+                </a:solidFill>
+              </a:rPr>
+              <a:t>▲</a:t>
+            </a:r>
+            <a:r>
+              <a:rPr/>
+              <a:t> 6,3%</a:t>
+            </a:r>
+          </a:p>
+        </p:txBody>
+      </p:sp>
+      <p:sp>
+        <p:nvSpPr>
+          <p:cNvPr id="11" name="CaixaDeTexto 10">
+            <a:extLst>
+              <a:ext uri="{FF2B5EF4-FFF2-40B4-BE49-F238E27FC236}">
+                <a16:creationId xmlns:a16="http://schemas.microsoft.com/office/drawing/2014/main" id="{0B9BF5A6-FA1C-94B2-BFF8-0EAFCF11AFF1}"/>
+              </a:ext>
+            </a:extLst>
+          </p:cNvPr>
+          <p:cNvSpPr txBox="1"/>
+          <p:nvPr/>
+        </p:nvSpPr>
+        <p:spPr>
+          <a:xfrm>
+            <a:off x="5121012" y="3749478"/>
+            <a:ext cx="1659429" cy="369332"/>
+          </a:xfrm>
+          <a:prstGeom prst="rect">
+            <a:avLst/>
+          </a:prstGeom>
+          <a:noFill/>
+        </p:spPr>
+        <p:txBody>
+          <a:bodyPr wrap="none" rtlCol="0">
+            <a:spAutoFit/>
+          </a:bodyPr>
+          <a:lstStyle/>
+          <a:p>
+            <a:r>
+              <a:rPr>
+                <a:solidFill>
+                  <a:srgbClr val="C00000"/>
+                </a:solidFill>
+              </a:rPr>
+              <a:t>▼</a:t>
+            </a:r>
+            <a:r>
+              <a:rPr/>
+              <a:t> 3,0%</a:t>
+            </a:r>
+          </a:p>
+        </p:txBody>
+      </p:sp>
+    </p:spTree>
+    <p:extLst>
+      <p:ext uri="{BB962C8B-B14F-4D97-AF65-F5344CB8AC3E}">
+        <p14:creationId xmlns:p14="http://schemas.microsoft.com/office/powerpoint/2010/main" val="372698860"/>
+      </p:ext>
+    </p:extLst>
+  </p:cSld>
+  <p:clrMapOvr>
+    <a:masterClrMapping/>
+  </p:clrMapOvr>
+</p:sld>
+</file>
+
 <file path=ppt/theme/theme1.xml><?xml version="1.0" encoding="utf-8"?>
 <a:theme xmlns:a="http://schemas.openxmlformats.org/drawingml/2006/main" name="Sala de Reunião de Ião">
   <a:themeElements>

</xml_diff>

<commit_message>
New Donut Charts and Others
</commit_message>
<xml_diff>
--- a/main_testing.pptx
+++ b/main_testing.pptx
@@ -8,6 +8,7 @@
     <p:sldId id="256" r:id="rId2"/>
     <p:sldId id="257" r:id="rId3"/>
     <p:sldId id="258" r:id="rId4"/>
+    <p:sldId id="259" r:id="rId5"/>
   </p:sldIdLst>
   <p:sldSz cx="12192000" cy="6858000"/>
   <p:notesSz cx="6858000" cy="9144000"/>
@@ -449,7 +450,7 @@
           <a:p>
             <a:fld id="{0FFCB9F6-63FC-4ED5-A42C-D418A1CF0414}" type="datetimeFigureOut">
               <a:rPr lang="pt-BR" smtClean="0"/>
-              <a:t>13/01/2026</a:t>
+              <a:t>23/01/2026</a:t>
             </a:fld>
             <a:endParaRPr lang="pt-BR"/>
           </a:p>
@@ -1537,7 +1538,7 @@
           <a:p>
             <a:fld id="{0FFCB9F6-63FC-4ED5-A42C-D418A1CF0414}" type="datetimeFigureOut">
               <a:rPr lang="pt-BR" smtClean="0"/>
-              <a:t>13/01/2026</a:t>
+              <a:t>23/01/2026</a:t>
             </a:fld>
             <a:endParaRPr lang="pt-BR"/>
           </a:p>
@@ -2517,7 +2518,7 @@
           <a:p>
             <a:fld id="{0FFCB9F6-63FC-4ED5-A42C-D418A1CF0414}" type="datetimeFigureOut">
               <a:rPr lang="pt-BR" smtClean="0"/>
-              <a:t>13/01/2026</a:t>
+              <a:t>23/01/2026</a:t>
             </a:fld>
             <a:endParaRPr lang="pt-BR"/>
           </a:p>
@@ -3651,7 +3652,7 @@
           <a:p>
             <a:fld id="{0FFCB9F6-63FC-4ED5-A42C-D418A1CF0414}" type="datetimeFigureOut">
               <a:rPr lang="pt-BR" smtClean="0"/>
-              <a:t>13/01/2026</a:t>
+              <a:t>23/01/2026</a:t>
             </a:fld>
             <a:endParaRPr lang="pt-BR"/>
           </a:p>
@@ -4684,7 +4685,7 @@
           <a:p>
             <a:fld id="{0FFCB9F6-63FC-4ED5-A42C-D418A1CF0414}" type="datetimeFigureOut">
               <a:rPr lang="pt-BR" smtClean="0"/>
-              <a:t>13/01/2026</a:t>
+              <a:t>23/01/2026</a:t>
             </a:fld>
             <a:endParaRPr lang="pt-BR"/>
           </a:p>
@@ -5344,7 +5345,7 @@
           <a:p>
             <a:fld id="{0FFCB9F6-63FC-4ED5-A42C-D418A1CF0414}" type="datetimeFigureOut">
               <a:rPr lang="pt-BR" smtClean="0"/>
-              <a:t>13/01/2026</a:t>
+              <a:t>23/01/2026</a:t>
             </a:fld>
             <a:endParaRPr lang="pt-BR"/>
           </a:p>
@@ -6205,7 +6206,7 @@
           <a:p>
             <a:fld id="{0FFCB9F6-63FC-4ED5-A42C-D418A1CF0414}" type="datetimeFigureOut">
               <a:rPr lang="pt-BR" smtClean="0"/>
-              <a:t>13/01/2026</a:t>
+              <a:t>23/01/2026</a:t>
             </a:fld>
             <a:endParaRPr lang="pt-BR"/>
           </a:p>
@@ -6395,7 +6396,7 @@
           <a:p>
             <a:fld id="{0FFCB9F6-63FC-4ED5-A42C-D418A1CF0414}" type="datetimeFigureOut">
               <a:rPr lang="pt-BR" smtClean="0"/>
-              <a:t>13/01/2026</a:t>
+              <a:t>23/01/2026</a:t>
             </a:fld>
             <a:endParaRPr lang="pt-BR"/>
           </a:p>
@@ -7367,7 +7368,7 @@
           <a:p>
             <a:fld id="{0FFCB9F6-63FC-4ED5-A42C-D418A1CF0414}" type="datetimeFigureOut">
               <a:rPr lang="pt-BR" smtClean="0"/>
-              <a:t>13/01/2026</a:t>
+              <a:t>23/01/2026</a:t>
             </a:fld>
             <a:endParaRPr lang="pt-BR"/>
           </a:p>
@@ -7578,7 +7579,7 @@
           <a:p>
             <a:fld id="{0FFCB9F6-63FC-4ED5-A42C-D418A1CF0414}" type="datetimeFigureOut">
               <a:rPr lang="pt-BR" smtClean="0"/>
-              <a:t>13/01/2026</a:t>
+              <a:t>23/01/2026</a:t>
             </a:fld>
             <a:endParaRPr lang="pt-BR"/>
           </a:p>
@@ -8612,7 +8613,7 @@
           <a:p>
             <a:fld id="{0FFCB9F6-63FC-4ED5-A42C-D418A1CF0414}" type="datetimeFigureOut">
               <a:rPr lang="pt-BR" smtClean="0"/>
-              <a:t>13/01/2026</a:t>
+              <a:t>23/01/2026</a:t>
             </a:fld>
             <a:endParaRPr lang="pt-BR"/>
           </a:p>
@@ -8884,7 +8885,7 @@
           <a:p>
             <a:fld id="{0FFCB9F6-63FC-4ED5-A42C-D418A1CF0414}" type="datetimeFigureOut">
               <a:rPr lang="pt-BR" smtClean="0"/>
-              <a:t>13/01/2026</a:t>
+              <a:t>23/01/2026</a:t>
             </a:fld>
             <a:endParaRPr lang="pt-BR"/>
           </a:p>
@@ -9294,7 +9295,7 @@
           <a:p>
             <a:fld id="{0FFCB9F6-63FC-4ED5-A42C-D418A1CF0414}" type="datetimeFigureOut">
               <a:rPr lang="pt-BR" smtClean="0"/>
-              <a:t>13/01/2026</a:t>
+              <a:t>23/01/2026</a:t>
             </a:fld>
             <a:endParaRPr lang="pt-BR"/>
           </a:p>
@@ -9421,7 +9422,7 @@
           <a:p>
             <a:fld id="{0FFCB9F6-63FC-4ED5-A42C-D418A1CF0414}" type="datetimeFigureOut">
               <a:rPr lang="pt-BR" smtClean="0"/>
-              <a:t>13/01/2026</a:t>
+              <a:t>23/01/2026</a:t>
             </a:fld>
             <a:endParaRPr lang="pt-BR"/>
           </a:p>
@@ -9516,7 +9517,7 @@
           <a:p>
             <a:fld id="{0FFCB9F6-63FC-4ED5-A42C-D418A1CF0414}" type="datetimeFigureOut">
               <a:rPr lang="pt-BR" smtClean="0"/>
-              <a:t>13/01/2026</a:t>
+              <a:t>23/01/2026</a:t>
             </a:fld>
             <a:endParaRPr lang="pt-BR"/>
           </a:p>
@@ -10597,7 +10598,7 @@
           <a:p>
             <a:fld id="{0FFCB9F6-63FC-4ED5-A42C-D418A1CF0414}" type="datetimeFigureOut">
               <a:rPr lang="pt-BR" smtClean="0"/>
-              <a:t>13/01/2026</a:t>
+              <a:t>23/01/2026</a:t>
             </a:fld>
             <a:endParaRPr lang="pt-BR"/>
           </a:p>
@@ -11705,7 +11706,7 @@
           <a:p>
             <a:fld id="{0FFCB9F6-63FC-4ED5-A42C-D418A1CF0414}" type="datetimeFigureOut">
               <a:rPr lang="pt-BR" smtClean="0"/>
-              <a:t>13/01/2026</a:t>
+              <a:t>23/01/2026</a:t>
             </a:fld>
             <a:endParaRPr lang="pt-BR"/>
           </a:p>
@@ -12702,7 +12703,7 @@
           <a:p>
             <a:fld id="{0FFCB9F6-63FC-4ED5-A42C-D418A1CF0414}" type="datetimeFigureOut">
               <a:rPr lang="pt-BR" smtClean="0"/>
-              <a:t>13/01/2026</a:t>
+              <a:t>23/01/2026</a:t>
             </a:fld>
             <a:endParaRPr lang="pt-BR"/>
           </a:p>
@@ -14818,6 +14819,214 @@
 </p:sld>
 </file>
 
+<file path=ppt/slides/slide4.xml><?xml version="1.0" encoding="utf-8"?>
+<p:sld xmlns:a="http://schemas.openxmlformats.org/drawingml/2006/main" xmlns:r="http://schemas.openxmlformats.org/officeDocument/2006/relationships" xmlns:p="http://schemas.openxmlformats.org/presentationml/2006/main">
+  <p:cSld>
+    <p:spTree>
+      <p:nvGrpSpPr>
+        <p:cNvPr id="1" name=""/>
+        <p:cNvGrpSpPr/>
+        <p:nvPr/>
+      </p:nvGrpSpPr>
+      <p:grpSpPr>
+        <a:xfrm>
+          <a:off x="0" y="0"/>
+          <a:ext cx="0" cy="0"/>
+          <a:chOff x="0" y="0"/>
+          <a:chExt cx="0" cy="0"/>
+        </a:xfrm>
+      </p:grpSpPr>
+      <p:sp>
+        <p:nvSpPr>
+          <p:cNvPr id="2" name="Título 1">
+            <a:extLst>
+              <a:ext uri="{FF2B5EF4-FFF2-40B4-BE49-F238E27FC236}">
+                <a16:creationId xmlns:a16="http://schemas.microsoft.com/office/drawing/2014/main" id="{375CEC55-5620-0728-8DD1-2BEC363F608F}"/>
+              </a:ext>
+            </a:extLst>
+          </p:cNvPr>
+          <p:cNvSpPr>
+            <a:spLocks noGrp="1"/>
+          </p:cNvSpPr>
+          <p:nvPr>
+            <p:ph type="title"/>
+          </p:nvPr>
+        </p:nvSpPr>
+        <p:spPr>
+          <a:xfrm>
+            <a:off x="1046922" y="509842"/>
+            <a:ext cx="8761413" cy="706964"/>
+          </a:xfrm>
+        </p:spPr>
+        <p:txBody>
+          <a:bodyPr/>
+          <a:lstStyle/>
+          <a:p>
+            <a:r>
+              <a:rPr lang="pt-BR" sz="3600" dirty="0"/>
+              <a:t>{{slide3_title}}</a:t>
+            </a:r>
+            <a:endParaRPr lang="pt-BR" dirty="0"/>
+          </a:p>
+        </p:txBody>
+      </p:sp>
+      <p:sp>
+        <p:nvSpPr>
+          <p:cNvPr id="3" name="Marcador de Posição de Conteúdo 2">
+            <a:extLst>
+              <a:ext uri="{FF2B5EF4-FFF2-40B4-BE49-F238E27FC236}">
+                <a16:creationId xmlns:a16="http://schemas.microsoft.com/office/drawing/2014/main" id="{C57F8E77-A7A9-E30B-4CEE-50AF85F63643}"/>
+              </a:ext>
+            </a:extLst>
+          </p:cNvPr>
+          <p:cNvSpPr>
+            <a:spLocks noGrp="1"/>
+          </p:cNvSpPr>
+          <p:nvPr>
+            <p:ph idx="1"/>
+          </p:nvPr>
+        </p:nvSpPr>
+        <p:spPr>
+          <a:xfrm>
+            <a:off x="1046922" y="1216806"/>
+            <a:ext cx="8825659" cy="537265"/>
+          </a:xfrm>
+        </p:spPr>
+        <p:txBody>
+          <a:bodyPr/>
+          <a:lstStyle/>
+          <a:p>
+            <a:r>
+              <a:rPr lang="pt-BR" sz="1800" dirty="0">
+                <a:solidFill>
+                  <a:schemeClr val="bg1"/>
+                </a:solidFill>
+              </a:rPr>
+              <a:t>{{slide3_subtitle}}</a:t>
+            </a:r>
+          </a:p>
+        </p:txBody>
+      </p:sp>
+      <p:pic>
+        <p:nvPicPr>
+          <p:cNvPr id="5" name="Imagem 4" descr="11_pizza_trimestres.png">
+            <a:extLst>
+              <a:ext uri="{FF2B5EF4-FFF2-40B4-BE49-F238E27FC236}">
+                <a16:creationId xmlns:a16="http://schemas.microsoft.com/office/drawing/2014/main" id="{D840404B-A47E-6A9F-A40B-036A8F14A081}"/>
+              </a:ext>
+            </a:extLst>
+          </p:cNvPr>
+          <p:cNvPicPr>
+            <a:picLocks noChangeAspect="1"/>
+          </p:cNvPicPr>
+          <p:nvPr/>
+        </p:nvPicPr>
+        <p:blipFill>
+          <a:blip r:embed="rId4">
+            <a:extLst>
+              <a:ext uri="{28A0092B-C50C-407E-A947-70E740481C1C}">
+                <a14:useLocalDpi xmlns:a14="http://schemas.microsoft.com/office/drawing/2010/main" val="0"/>
+              </a:ext>
+            </a:extLst>
+          </a:blip>
+          <a:stretch>
+            <a:fillRect/>
+          </a:stretch>
+        </p:blipFill>
+        <p:spPr>
+          <a:xfrm>
+            <a:off x="5969681" y="2902533"/>
+            <a:ext cx="2816277" cy="1355230"/>
+          </a:xfrm>
+          <a:prstGeom prst="rect">
+            <a:avLst/>
+          </a:prstGeom>
+        </p:spPr>
+      </p:pic>
+      <p:pic>
+        <p:nvPicPr>
+          <p:cNvPr id="7" name="Imagem 6" descr="10_pizza_carteira.png">
+            <a:extLst>
+              <a:ext uri="{FF2B5EF4-FFF2-40B4-BE49-F238E27FC236}">
+                <a16:creationId xmlns:a16="http://schemas.microsoft.com/office/drawing/2014/main" id="{9C13C664-05E8-1769-F9F7-133DBFCE9BD2}"/>
+              </a:ext>
+            </a:extLst>
+          </p:cNvPr>
+          <p:cNvPicPr>
+            <a:picLocks noChangeAspect="1"/>
+          </p:cNvPicPr>
+          <p:nvPr/>
+        </p:nvPicPr>
+        <p:blipFill>
+          <a:blip r:embed="rId5">
+            <a:extLst>
+              <a:ext uri="{28A0092B-C50C-407E-A947-70E740481C1C}">
+                <a14:useLocalDpi xmlns:a14="http://schemas.microsoft.com/office/drawing/2010/main" val="0"/>
+              </a:ext>
+            </a:extLst>
+          </a:blip>
+          <a:srcRect l="5339" t="10725" r="4693" b="12613"/>
+          <a:stretch/>
+        </p:blipFill>
+        <p:spPr>
+          <a:xfrm>
+            <a:off x="237750" y="2189431"/>
+            <a:ext cx="5576454" cy="4325550"/>
+          </a:xfrm>
+          <a:prstGeom prst="rect">
+            <a:avLst/>
+          </a:prstGeom>
+        </p:spPr>
+      </p:pic>
+      <p:pic>
+        <p:nvPicPr>
+          <p:cNvPr id="4" name="Imagem 3" descr="12_pizza_9m.png">
+            <a:extLst>
+              <a:ext uri="{FF2B5EF4-FFF2-40B4-BE49-F238E27FC236}">
+                <a16:creationId xmlns:a16="http://schemas.microsoft.com/office/drawing/2014/main" id="{7BD7931B-383C-C5B4-A3CD-70A0D6FC6EE7}"/>
+              </a:ext>
+            </a:extLst>
+          </p:cNvPr>
+          <p:cNvPicPr>
+            <a:picLocks noChangeAspect="1"/>
+          </p:cNvPicPr>
+          <p:nvPr/>
+        </p:nvPicPr>
+        <p:blipFill>
+          <a:blip r:embed="rId6">
+            <a:extLst>
+              <a:ext uri="{28A0092B-C50C-407E-A947-70E740481C1C}">
+                <a14:useLocalDpi xmlns:a14="http://schemas.microsoft.com/office/drawing/2010/main" val="0"/>
+              </a:ext>
+            </a:extLst>
+          </a:blip>
+          <a:stretch>
+            <a:fillRect/>
+          </a:stretch>
+        </p:blipFill>
+        <p:spPr>
+          <a:xfrm>
+            <a:off x="9137973" y="2830105"/>
+            <a:ext cx="2816277" cy="1355230"/>
+          </a:xfrm>
+          <a:prstGeom prst="rect">
+            <a:avLst/>
+          </a:prstGeom>
+        </p:spPr>
+      </p:pic>
+    </p:spTree>
+    <p:extLst>
+      <p:ext uri="{BB962C8B-B14F-4D97-AF65-F5344CB8AC3E}">
+        <p14:creationId xmlns:p14="http://schemas.microsoft.com/office/powerpoint/2010/main" val="4284298719"/>
+      </p:ext>
+    </p:extLst>
+  </p:cSld>
+  <p:clrMapOvr>
+    <a:masterClrMapping/>
+  </p:clrMapOvr>
+</p:sld>
+</file>
+
 <file path=ppt/theme/theme1.xml><?xml version="1.0" encoding="utf-8"?>
 <a:theme xmlns:a="http://schemas.openxmlformats.org/drawingml/2006/main" name="Sala de Reunião de Ião">
   <a:themeElements>

</xml_diff>